<commit_message>
Updated links in ppts.
</commit_message>
<xml_diff>
--- a/01 - Azure Storage/Azure Storage.pptx
+++ b/01 - Azure Storage/Azure Storage.pptx
@@ -260,7 +260,7 @@
             <a:pPr rtl="0"/>
             <a:fld id="{268207A6-7ADA-45B8-951F-34576C3577BD}" type="datetime1">
               <a:rPr lang="sk-SK" smtClean="0"/>
-              <a:t>17. 5. 2021</a:t>
+              <a:t>9. 6. 2021</a:t>
             </a:fld>
             <a:endParaRPr lang="sk-SK" dirty="0"/>
           </a:p>
@@ -430,7 +430,7 @@
             <a:pPr rtl="0"/>
             <a:fld id="{591A0293-3DCA-4153-B68A-A2DB651509C0}" type="datetime1">
               <a:rPr lang="sk-SK" noProof="0" smtClean="0"/>
-              <a:t>17. 5. 2021</a:t>
+              <a:t>9. 6. 2021</a:t>
             </a:fld>
             <a:endParaRPr lang="sk-SK" noProof="0" dirty="0"/>
           </a:p>
@@ -1380,7 +1380,7 @@
             <a:pPr rtl="0"/>
             <a:fld id="{900FA921-B42C-4118-B7D5-0895D3550D77}" type="datetime1">
               <a:rPr lang="sk-SK" noProof="0" smtClean="0"/>
-              <a:t>17. 5. 2021</a:t>
+              <a:t>9. 6. 2021</a:t>
             </a:fld>
             <a:endParaRPr lang="sk-SK" noProof="0" dirty="0"/>
           </a:p>
@@ -1677,7 +1677,7 @@
             <a:pPr rtl="0"/>
             <a:fld id="{4BEE775C-7769-4983-973F-31EBB41A2D12}" type="datetime1">
               <a:rPr lang="sk-SK" noProof="0" smtClean="0"/>
-              <a:t>17. 5. 2021</a:t>
+              <a:t>9. 6. 2021</a:t>
             </a:fld>
             <a:endParaRPr lang="sk-SK" noProof="0" dirty="0"/>
           </a:p>
@@ -1925,7 +1925,7 @@
             <a:pPr rtl="0"/>
             <a:fld id="{C932E5DF-018E-49DA-B38A-5E65209E32B5}" type="datetime1">
               <a:rPr lang="sk-SK" noProof="0" smtClean="0"/>
-              <a:t>17. 5. 2021</a:t>
+              <a:t>9. 6. 2021</a:t>
             </a:fld>
             <a:endParaRPr lang="sk-SK" noProof="0" dirty="0"/>
           </a:p>
@@ -2465,7 +2465,7 @@
             <a:pPr rtl="0"/>
             <a:fld id="{5109D02C-C2F0-42B1-AF2A-7F22B5DC25B0}" type="datetime1">
               <a:rPr lang="sk-SK" noProof="0" smtClean="0"/>
-              <a:t>17. 5. 2021</a:t>
+              <a:t>9. 6. 2021</a:t>
             </a:fld>
             <a:endParaRPr lang="sk-SK" noProof="0" dirty="0"/>
           </a:p>
@@ -2713,7 +2713,7 @@
             <a:pPr rtl="0"/>
             <a:fld id="{27313ED6-7DF5-4EA8-A15A-56106F4AB1A8}" type="datetime1">
               <a:rPr lang="sk-SK" noProof="0" smtClean="0"/>
-              <a:t>17. 5. 2021</a:t>
+              <a:t>9. 6. 2021</a:t>
             </a:fld>
             <a:endParaRPr lang="sk-SK" noProof="0" dirty="0"/>
           </a:p>
@@ -3245,7 +3245,7 @@
             <a:pPr rtl="0"/>
             <a:fld id="{460B05BE-B82C-4836-BEE3-86B662C73967}" type="datetime1">
               <a:rPr lang="sk-SK" noProof="0" smtClean="0"/>
-              <a:t>17. 5. 2021</a:t>
+              <a:t>9. 6. 2021</a:t>
             </a:fld>
             <a:endParaRPr lang="sk-SK" noProof="0" dirty="0"/>
           </a:p>
@@ -3541,7 +3541,7 @@
             <a:pPr rtl="0"/>
             <a:fld id="{B6D80D0C-15C1-4232-BBBA-C081C283B074}" type="datetime1">
               <a:rPr lang="sk-SK" noProof="0" smtClean="0"/>
-              <a:t>17. 5. 2021</a:t>
+              <a:t>9. 6. 2021</a:t>
             </a:fld>
             <a:endParaRPr lang="sk-SK" noProof="0" dirty="0"/>
           </a:p>
@@ -3715,7 +3715,7 @@
             <a:pPr rtl="0"/>
             <a:fld id="{9C092629-6D55-437C-89A0-31B0B55C4A73}" type="datetime1">
               <a:rPr lang="sk-SK" noProof="0" smtClean="0"/>
-              <a:t>17. 5. 2021</a:t>
+              <a:t>9. 6. 2021</a:t>
             </a:fld>
             <a:endParaRPr lang="sk-SK" noProof="0" dirty="0"/>
           </a:p>
@@ -3895,7 +3895,7 @@
             <a:pPr rtl="0"/>
             <a:fld id="{45F7A265-AC1F-4DE6-B2E7-EDDEC1CB13AE}" type="datetime1">
               <a:rPr lang="sk-SK" noProof="0" smtClean="0"/>
-              <a:t>17. 5. 2021</a:t>
+              <a:t>9. 6. 2021</a:t>
             </a:fld>
             <a:endParaRPr lang="sk-SK" noProof="0" dirty="0"/>
           </a:p>
@@ -4065,7 +4065,7 @@
             <a:pPr rtl="0"/>
             <a:fld id="{556A154B-A35F-4191-B844-7C2621556C5A}" type="datetime1">
               <a:rPr lang="sk-SK" noProof="0" smtClean="0"/>
-              <a:t>17. 5. 2021</a:t>
+              <a:t>9. 6. 2021</a:t>
             </a:fld>
             <a:endParaRPr lang="sk-SK" noProof="0" dirty="0"/>
           </a:p>
@@ -4316,7 +4316,7 @@
             <a:pPr rtl="0"/>
             <a:fld id="{ECC8ABC4-B50E-4AED-80D0-A4EA425A67F1}" type="datetime1">
               <a:rPr lang="sk-SK" noProof="0" smtClean="0"/>
-              <a:t>17. 5. 2021</a:t>
+              <a:t>9. 6. 2021</a:t>
             </a:fld>
             <a:endParaRPr lang="sk-SK" noProof="0" dirty="0"/>
           </a:p>
@@ -4613,7 +4613,7 @@
             <a:pPr rtl="0"/>
             <a:fld id="{79846675-4AE1-4AA6-90BD-F0C34E95FD01}" type="datetime1">
               <a:rPr lang="sk-SK" noProof="0" smtClean="0"/>
-              <a:t>17. 5. 2021</a:t>
+              <a:t>9. 6. 2021</a:t>
             </a:fld>
             <a:endParaRPr lang="sk-SK" noProof="0" dirty="0"/>
           </a:p>
@@ -5055,7 +5055,7 @@
             <a:pPr rtl="0"/>
             <a:fld id="{7378032B-3EDA-4C05-BE29-4965CEDCD681}" type="datetime1">
               <a:rPr lang="sk-SK" noProof="0" smtClean="0"/>
-              <a:t>17. 5. 2021</a:t>
+              <a:t>9. 6. 2021</a:t>
             </a:fld>
             <a:endParaRPr lang="sk-SK" noProof="0" dirty="0"/>
           </a:p>
@@ -5173,7 +5173,7 @@
             <a:pPr rtl="0"/>
             <a:fld id="{8E1C420E-D5B6-4085-8589-6BD6C0D15322}" type="datetime1">
               <a:rPr lang="sk-SK" noProof="0" smtClean="0"/>
-              <a:t>17. 5. 2021</a:t>
+              <a:t>9. 6. 2021</a:t>
             </a:fld>
             <a:endParaRPr lang="sk-SK" noProof="0" dirty="0"/>
           </a:p>
@@ -5267,7 +5267,7 @@
             <a:pPr rtl="0"/>
             <a:fld id="{EE61EFEC-06A5-463A-84CB-3AC23AB02C2D}" type="datetime1">
               <a:rPr lang="sk-SK" noProof="0" smtClean="0"/>
-              <a:t>17. 5. 2021</a:t>
+              <a:t>9. 6. 2021</a:t>
             </a:fld>
             <a:endParaRPr lang="sk-SK" noProof="0" dirty="0"/>
           </a:p>
@@ -5550,7 +5550,7 @@
             <a:pPr rtl="0"/>
             <a:fld id="{2EB672FB-3028-4C4A-9E46-B78FDE73405B}" type="datetime1">
               <a:rPr lang="sk-SK" noProof="0" smtClean="0"/>
-              <a:t>17. 5. 2021</a:t>
+              <a:t>9. 6. 2021</a:t>
             </a:fld>
             <a:endParaRPr lang="sk-SK" noProof="0" dirty="0"/>
           </a:p>
@@ -5842,7 +5842,7 @@
             <a:pPr rtl="0"/>
             <a:fld id="{60367B1A-8B56-4DB3-9D45-FDEF93DAB338}" type="datetime1">
               <a:rPr lang="sk-SK" noProof="0" smtClean="0"/>
-              <a:t>17. 5. 2021</a:t>
+              <a:t>9. 6. 2021</a:t>
             </a:fld>
             <a:endParaRPr lang="sk-SK" noProof="0" dirty="0"/>
           </a:p>
@@ -6370,7 +6370,7 @@
             <a:pPr rtl="0"/>
             <a:fld id="{34C29ED1-23D1-4646-81FC-DC0A2419921B}" type="datetime1">
               <a:rPr lang="sk-SK" noProof="0" smtClean="0"/>
-              <a:t>17. 5. 2021</a:t>
+              <a:t>9. 6. 2021</a:t>
             </a:fld>
             <a:endParaRPr lang="sk-SK" noProof="0" dirty="0"/>
           </a:p>
@@ -14876,10 +14876,10 @@
           <a:p>
             <a:pPr lvl="1"/>
             <a:r>
-              <a:rPr lang="sk-SK" dirty="0">
+              <a:rPr lang="sk-SK">
                 <a:hlinkClick r:id="rId2"/>
               </a:rPr>
-              <a:t>https://github.com/kubinko/Azure_Resources_Overview</a:t>
+              <a:t>https://github.com/kubinko/Azure-Resources-Overview</a:t>
             </a:r>
             <a:endParaRPr lang="sk-SK" dirty="0"/>
           </a:p>
@@ -16707,12 +16707,6 @@
 </file>
 
 <file path=customXml/item1.xml><?xml version="1.0" encoding="utf-8"?>
-<p:properties xmlns:p="http://schemas.microsoft.com/office/2006/metadata/properties" xmlns:xsi="http://www.w3.org/2001/XMLSchema-instance" xmlns:pc="http://schemas.microsoft.com/office/infopath/2007/PartnerControls">
-  <documentManagement/>
-</p:properties>
-</file>
-
-<file path=customXml/item2.xml><?xml version="1.0" encoding="utf-8"?>
 <ct:contentTypeSchema xmlns:ct="http://schemas.microsoft.com/office/2006/metadata/contentType" xmlns:ma="http://schemas.microsoft.com/office/2006/metadata/properties/metaAttributes" ct:_="" ma:_="" ma:contentTypeName="Dokument" ma:contentTypeID="0x010100D81D723D8BF7FD46A3A6BCCE71436C13" ma:contentTypeVersion="9" ma:contentTypeDescription="Umožňuje vytvoriť nový dokument." ma:contentTypeScope="" ma:versionID="5027bbb3b2b87f7facb5ec0a1a051276">
   <xsd:schema xmlns:xsd="http://www.w3.org/2001/XMLSchema" xmlns:xs="http://www.w3.org/2001/XMLSchema" xmlns:p="http://schemas.microsoft.com/office/2006/metadata/properties" xmlns:ns3="246628ed-b902-4bde-9cb2-b95f5582a2ce" xmlns:ns4="4e8b0afe-22a4-452b-ae06-8cabd0658848" targetNamespace="http://schemas.microsoft.com/office/2006/metadata/properties" ma:root="true" ma:fieldsID="f5d73a384b069110ab5db9ac98912687" ns3:_="" ns4:_="">
     <xsd:import namespace="246628ed-b902-4bde-9cb2-b95f5582a2ce"/>
@@ -16909,7 +16903,7 @@
 </ct:contentTypeSchema>
 </file>
 
-<file path=customXml/item3.xml><?xml version="1.0" encoding="utf-8"?>
+<file path=customXml/item2.xml><?xml version="1.0" encoding="utf-8"?>
 <?mso-contentType ?>
 <FormTemplates xmlns="http://schemas.microsoft.com/sharepoint/v3/contenttype/forms">
   <Display>DocumentLibraryForm</Display>
@@ -16918,24 +16912,13 @@
 </FormTemplates>
 </file>
 
-<file path=customXml/itemProps1.xml><?xml version="1.0" encoding="utf-8"?>
-<ds:datastoreItem xmlns:ds="http://schemas.openxmlformats.org/officeDocument/2006/customXml" ds:itemID="{D7023227-530E-4024-91EF-312A851A758C}">
-  <ds:schemaRefs>
-    <ds:schemaRef ds:uri="http://schemas.microsoft.com/office/2006/documentManagement/types"/>
-    <ds:schemaRef ds:uri="http://purl.org/dc/elements/1.1/"/>
-    <ds:schemaRef ds:uri="http://purl.org/dc/dcmitype/"/>
-    <ds:schemaRef ds:uri="http://schemas.microsoft.com/office/infopath/2007/PartnerControls"/>
-    <ds:schemaRef ds:uri="http://purl.org/dc/terms/"/>
-    <ds:schemaRef ds:uri="246628ed-b902-4bde-9cb2-b95f5582a2ce"/>
-    <ds:schemaRef ds:uri="4e8b0afe-22a4-452b-ae06-8cabd0658848"/>
-    <ds:schemaRef ds:uri="http://schemas.openxmlformats.org/package/2006/metadata/core-properties"/>
-    <ds:schemaRef ds:uri="http://schemas.microsoft.com/office/2006/metadata/properties"/>
-    <ds:schemaRef ds:uri="http://www.w3.org/XML/1998/namespace"/>
-  </ds:schemaRefs>
-</ds:datastoreItem>
+<file path=customXml/item3.xml><?xml version="1.0" encoding="utf-8"?>
+<p:properties xmlns:p="http://schemas.microsoft.com/office/2006/metadata/properties" xmlns:xsi="http://www.w3.org/2001/XMLSchema-instance" xmlns:pc="http://schemas.microsoft.com/office/infopath/2007/PartnerControls">
+  <documentManagement/>
+</p:properties>
 </file>
 
-<file path=customXml/itemProps2.xml><?xml version="1.0" encoding="utf-8"?>
+<file path=customXml/itemProps1.xml><?xml version="1.0" encoding="utf-8"?>
 <ds:datastoreItem xmlns:ds="http://schemas.openxmlformats.org/officeDocument/2006/customXml" ds:itemID="{60E9A80C-22BC-45AC-8E2E-E86FB731BF06}">
   <ds:schemaRefs>
     <ds:schemaRef ds:uri="http://schemas.microsoft.com/office/2006/metadata/contentType"/>
@@ -16954,10 +16937,27 @@
 </ds:datastoreItem>
 </file>
 
-<file path=customXml/itemProps3.xml><?xml version="1.0" encoding="utf-8"?>
+<file path=customXml/itemProps2.xml><?xml version="1.0" encoding="utf-8"?>
 <ds:datastoreItem xmlns:ds="http://schemas.openxmlformats.org/officeDocument/2006/customXml" ds:itemID="{33315AA3-EAE3-44ED-8368-BAC2FFFB4817}">
   <ds:schemaRefs>
     <ds:schemaRef ds:uri="http://schemas.microsoft.com/sharepoint/v3/contenttype/forms"/>
   </ds:schemaRefs>
 </ds:datastoreItem>
+</file>
+
+<file path=customXml/itemProps3.xml><?xml version="1.0" encoding="utf-8"?>
+<ds:datastoreItem xmlns:ds="http://schemas.openxmlformats.org/officeDocument/2006/customXml" ds:itemID="{D7023227-530E-4024-91EF-312A851A758C}">
+  <ds:schemaRefs>
+    <ds:schemaRef ds:uri="http://schemas.microsoft.com/office/2006/documentManagement/types"/>
+    <ds:schemaRef ds:uri="http://purl.org/dc/elements/1.1/"/>
+    <ds:schemaRef ds:uri="http://purl.org/dc/dcmitype/"/>
+    <ds:schemaRef ds:uri="http://schemas.microsoft.com/office/infopath/2007/PartnerControls"/>
+    <ds:schemaRef ds:uri="http://purl.org/dc/terms/"/>
+    <ds:schemaRef ds:uri="246628ed-b902-4bde-9cb2-b95f5582a2ce"/>
+    <ds:schemaRef ds:uri="4e8b0afe-22a4-452b-ae06-8cabd0658848"/>
+    <ds:schemaRef ds:uri="http://schemas.openxmlformats.org/package/2006/metadata/core-properties"/>
+    <ds:schemaRef ds:uri="http://schemas.microsoft.com/office/2006/metadata/properties"/>
+    <ds:schemaRef ds:uri="http://www.w3.org/XML/1998/namespace"/>
+  </ds:schemaRefs>
+</ds:datastoreItem>
 </file>
</xml_diff>